<commit_message>
Updated builder for table sizing
</commit_message>
<xml_diff>
--- a/tests/test_output.pptx
+++ b/tests/test_output.pptx
@@ -3452,9 +3452,10 @@
         </p:nvSpPr>
         <p:spPr/>
         <p:txBody>
-          <a:bodyPr wrap="square"/>
-          <a:lstStyle/>
-          <a:p>
+          <a:bodyPr wrap="square" anchor="t"/>
+          <a:lstStyle/>
+          <a:p>
+            <a:pPr algn="l"/>
             <a:r>
               <a:t>Bullet Slide Title</a:t>
             </a:r>
@@ -3473,22 +3474,22 @@
         </p:nvSpPr>
         <p:spPr/>
         <p:txBody>
-          <a:bodyPr wrap="square"/>
-          <a:lstStyle/>
-          <a:p>
-            <a:pPr/>
+          <a:bodyPr wrap="square" anchor="t"/>
+          <a:lstStyle/>
+          <a:p>
+            <a:pPr algn="l"/>
             <a:r>
               <a:t>Point A</a:t>
             </a:r>
           </a:p>
           <a:p>
-            <a:pPr/>
+            <a:pPr algn="l"/>
             <a:r>
               <a:t>Point B</a:t>
             </a:r>
           </a:p>
           <a:p>
-            <a:pPr/>
+            <a:pPr algn="l"/>
             <a:r>
               <a:t>Point C</a:t>
             </a:r>
@@ -3504,327 +3505,6 @@
 </file>
 
 <file path=ppt/slides/slide2.xml><?xml version="1.0" encoding="utf-8"?>
-<p:sld xmlns:a="http://schemas.openxmlformats.org/drawingml/2006/main" xmlns:p="http://schemas.openxmlformats.org/presentationml/2006/main" xmlns:r="http://schemas.openxmlformats.org/officeDocument/2006/relationships">
-  <p:cSld>
-    <p:spTree>
-      <p:nvGrpSpPr>
-        <p:cNvPr id="1" name=""/>
-        <p:cNvGrpSpPr/>
-        <p:nvPr/>
-      </p:nvGrpSpPr>
-      <p:grpSpPr/>
-      <p:sp>
-        <p:nvSpPr>
-          <p:cNvPr id="2" name="Title 1"/>
-          <p:cNvSpPr>
-            <a:spLocks noGrp="1"/>
-          </p:cNvSpPr>
-          <p:nvPr>
-            <p:ph type="title"/>
-          </p:nvPr>
-        </p:nvSpPr>
-        <p:spPr/>
-        <p:txBody>
-          <a:bodyPr wrap="square"/>
-          <a:lstStyle/>
-          <a:p>
-            <a:r>
-              <a:t>Comparison Title</a:t>
-            </a:r>
-          </a:p>
-        </p:txBody>
-      </p:sp>
-      <p:sp>
-        <p:nvSpPr>
-          <p:cNvPr id="3" name="Text Placeholder 2"/>
-          <p:cNvSpPr>
-            <a:spLocks noGrp="1"/>
-          </p:cNvSpPr>
-          <p:nvPr>
-            <p:ph type="body" idx="1"/>
-          </p:nvPr>
-        </p:nvSpPr>
-        <p:spPr/>
-        <p:txBody>
-          <a:bodyPr wrap="square"/>
-          <a:lstStyle/>
-          <a:p>
-            <a:r>
-              <a:t>Item A</a:t>
-            </a:r>
-          </a:p>
-        </p:txBody>
-      </p:sp>
-      <p:sp>
-        <p:nvSpPr>
-          <p:cNvPr id="4" name="Content Placeholder 3"/>
-          <p:cNvSpPr>
-            <a:spLocks noGrp="1"/>
-          </p:cNvSpPr>
-          <p:nvPr>
-            <p:ph idx="2" sz="half"/>
-          </p:nvPr>
-        </p:nvSpPr>
-        <p:spPr/>
-        <p:txBody>
-          <a:bodyPr wrap="square"/>
-          <a:lstStyle/>
-          <a:p>
-            <a:r>
-              <a:t>Detail A</a:t>
-            </a:r>
-          </a:p>
-        </p:txBody>
-      </p:sp>
-      <p:sp>
-        <p:nvSpPr>
-          <p:cNvPr id="5" name="Text Placeholder 4"/>
-          <p:cNvSpPr>
-            <a:spLocks noGrp="1"/>
-          </p:cNvSpPr>
-          <p:nvPr>
-            <p:ph type="body" idx="3" sz="quarter"/>
-          </p:nvPr>
-        </p:nvSpPr>
-        <p:spPr/>
-        <p:txBody>
-          <a:bodyPr wrap="square"/>
-          <a:lstStyle/>
-          <a:p>
-            <a:r>
-              <a:t>Item B</a:t>
-            </a:r>
-          </a:p>
-        </p:txBody>
-      </p:sp>
-      <p:sp>
-        <p:nvSpPr>
-          <p:cNvPr id="6" name="Content Placeholder 5"/>
-          <p:cNvSpPr>
-            <a:spLocks noGrp="1"/>
-          </p:cNvSpPr>
-          <p:nvPr>
-            <p:ph idx="4" sz="quarter"/>
-          </p:nvPr>
-        </p:nvSpPr>
-        <p:spPr/>
-        <p:txBody>
-          <a:bodyPr wrap="square"/>
-          <a:lstStyle/>
-          <a:p>
-            <a:r>
-              <a:t>Detail B</a:t>
-            </a:r>
-          </a:p>
-        </p:txBody>
-      </p:sp>
-    </p:spTree>
-  </p:cSld>
-  <p:clrMapOvr>
-    <a:masterClrMapping/>
-  </p:clrMapOvr>
-</p:sld>
-</file>
-
-<file path=ppt/slides/slide3.xml><?xml version="1.0" encoding="utf-8"?>
-<p:sld xmlns:a="http://schemas.openxmlformats.org/drawingml/2006/main" xmlns:p="http://schemas.openxmlformats.org/presentationml/2006/main" xmlns:r="http://schemas.openxmlformats.org/officeDocument/2006/relationships">
-  <p:cSld>
-    <p:spTree>
-      <p:nvGrpSpPr>
-        <p:cNvPr id="1" name=""/>
-        <p:cNvGrpSpPr/>
-        <p:nvPr/>
-      </p:nvGrpSpPr>
-      <p:grpSpPr/>
-      <p:sp>
-        <p:nvSpPr>
-          <p:cNvPr id="2" name="Title 1"/>
-          <p:cNvSpPr>
-            <a:spLocks noGrp="1"/>
-          </p:cNvSpPr>
-          <p:nvPr>
-            <p:ph type="title"/>
-          </p:nvPr>
-        </p:nvSpPr>
-        <p:spPr/>
-        <p:txBody>
-          <a:bodyPr wrap="square"/>
-          <a:lstStyle/>
-          <a:p>
-            <a:r>
-              <a:t>Main Content</a:t>
-            </a:r>
-          </a:p>
-        </p:txBody>
-      </p:sp>
-      <p:sp>
-        <p:nvSpPr>
-          <p:cNvPr id="3" name="Content Placeholder 2"/>
-          <p:cNvSpPr>
-            <a:spLocks noGrp="1"/>
-          </p:cNvSpPr>
-          <p:nvPr>
-            <p:ph idx="1"/>
-          </p:nvPr>
-        </p:nvSpPr>
-        <p:spPr/>
-        <p:txBody>
-          <a:bodyPr wrap="square"/>
-          <a:lstStyle/>
-          <a:p>
-            <a:r>
-              <a:t>Caption Header</a:t>
-            </a:r>
-          </a:p>
-        </p:txBody>
-      </p:sp>
-      <p:sp>
-        <p:nvSpPr>
-          <p:cNvPr id="4" name="Text Placeholder 3"/>
-          <p:cNvSpPr>
-            <a:spLocks noGrp="1"/>
-          </p:cNvSpPr>
-          <p:nvPr>
-            <p:ph type="body" idx="2" sz="half"/>
-          </p:nvPr>
-        </p:nvSpPr>
-        <p:spPr/>
-        <p:txBody>
-          <a:bodyPr wrap="square"/>
-          <a:lstStyle/>
-          <a:p>
-            <a:r>
-              <a:t>Additional Info</a:t>
-            </a:r>
-          </a:p>
-        </p:txBody>
-      </p:sp>
-    </p:spTree>
-  </p:cSld>
-  <p:clrMapOvr>
-    <a:masterClrMapping/>
-  </p:clrMapOvr>
-</p:sld>
-</file>
-
-<file path=ppt/slides/slide4.xml><?xml version="1.0" encoding="utf-8"?>
-<p:sld xmlns:a="http://schemas.openxmlformats.org/drawingml/2006/main" xmlns:p="http://schemas.openxmlformats.org/presentationml/2006/main" xmlns:r="http://schemas.openxmlformats.org/officeDocument/2006/relationships">
-  <p:cSld>
-    <p:spTree>
-      <p:nvGrpSpPr>
-        <p:cNvPr id="1" name=""/>
-        <p:cNvGrpSpPr/>
-        <p:nvPr/>
-      </p:nvGrpSpPr>
-      <p:grpSpPr/>
-      <p:sp>
-        <p:nvSpPr>
-          <p:cNvPr id="2" name="TextBox 1"/>
-          <p:cNvSpPr txBox="1"/>
-          <p:nvPr/>
-        </p:nvSpPr>
-        <p:spPr>
-          <a:xfrm>
-            <a:off x="841248" y="2139696"/>
-            <a:ext cx="10515600" cy="1325880"/>
-          </a:xfrm>
-          <a:prstGeom prst="rect">
-            <a:avLst/>
-          </a:prstGeom>
-          <a:noFill/>
-        </p:spPr>
-        <p:txBody>
-          <a:bodyPr wrap="square" anchor="b">
-            <a:spAutoFit/>
-          </a:bodyPr>
-          <a:lstStyle/>
-          <a:p>
-            <a:pPr algn="r"/>
-            <a:r>
-              <a:rPr sz="3600" b="1">
-                <a:latin typeface="Avenir LT Next Pro"/>
-              </a:rPr>
-              <a:t>Presentation Title</a:t>
-            </a:r>
-          </a:p>
-        </p:txBody>
-      </p:sp>
-      <p:sp>
-        <p:nvSpPr>
-          <p:cNvPr id="3" name="TextBox 2"/>
-          <p:cNvSpPr txBox="1"/>
-          <p:nvPr/>
-        </p:nvSpPr>
-        <p:spPr>
-          <a:xfrm>
-            <a:off x="841248" y="3474720"/>
-            <a:ext cx="10515600" cy="914400"/>
-          </a:xfrm>
-          <a:prstGeom prst="rect">
-            <a:avLst/>
-          </a:prstGeom>
-          <a:noFill/>
-        </p:spPr>
-        <p:txBody>
-          <a:bodyPr wrap="square" anchor="t">
-            <a:spAutoFit/>
-          </a:bodyPr>
-          <a:lstStyle/>
-          <a:p>
-            <a:pPr algn="r"/>
-            <a:r>
-              <a:rPr sz="3600" b="1" i="1">
-                <a:solidFill>
-                  <a:srgbClr val="4EA72E"/>
-                </a:solidFill>
-                <a:latin typeface="Avenir LT Next Pro"/>
-              </a:rPr>
-              <a:t>Strategic Report</a:t>
-            </a:r>
-          </a:p>
-        </p:txBody>
-      </p:sp>
-      <p:sp>
-        <p:nvSpPr>
-          <p:cNvPr id="4" name="TextBox 3"/>
-          <p:cNvSpPr txBox="1"/>
-          <p:nvPr/>
-        </p:nvSpPr>
-        <p:spPr>
-          <a:xfrm>
-            <a:off x="841248" y="4919472"/>
-            <a:ext cx="10515600" cy="914400"/>
-          </a:xfrm>
-          <a:prstGeom prst="rect">
-            <a:avLst/>
-          </a:prstGeom>
-          <a:noFill/>
-        </p:spPr>
-        <p:txBody>
-          <a:bodyPr wrap="square" anchor="t">
-            <a:spAutoFit/>
-          </a:bodyPr>
-          <a:lstStyle/>
-          <a:p>
-            <a:pPr algn="r"/>
-            <a:r>
-              <a:rPr sz="2400" b="1">
-                <a:latin typeface="Avenir LT Next Pro"/>
-              </a:rPr>
-              <a:t>April 2025</a:t>
-            </a:r>
-          </a:p>
-        </p:txBody>
-      </p:sp>
-    </p:spTree>
-  </p:cSld>
-  <p:clrMapOvr>
-    <a:masterClrMapping/>
-  </p:clrMapOvr>
-</p:sld>
-</file>
-
-<file path=ppt/slides/slide5.xml><?xml version="1.0" encoding="utf-8"?>
 <p:sld xmlns:a="http://schemas.openxmlformats.org/drawingml/2006/main" xmlns:p="http://schemas.openxmlformats.org/presentationml/2006/main" xmlns:r="http://schemas.openxmlformats.org/officeDocument/2006/relationships">
   <p:cSld>
     <p:spTree>
@@ -3898,6 +3578,302 @@
 </p:sld>
 </file>
 
+<file path=ppt/slides/slide3.xml><?xml version="1.0" encoding="utf-8"?>
+<p:sld xmlns:a="http://schemas.openxmlformats.org/drawingml/2006/main" xmlns:p="http://schemas.openxmlformats.org/presentationml/2006/main" xmlns:r="http://schemas.openxmlformats.org/officeDocument/2006/relationships">
+  <p:cSld>
+    <p:spTree>
+      <p:nvGrpSpPr>
+        <p:cNvPr id="1" name=""/>
+        <p:cNvGrpSpPr/>
+        <p:nvPr/>
+      </p:nvGrpSpPr>
+      <p:grpSpPr/>
+      <p:sp>
+        <p:nvSpPr>
+          <p:cNvPr id="2" name="Title 1"/>
+          <p:cNvSpPr>
+            <a:spLocks noGrp="1"/>
+          </p:cNvSpPr>
+          <p:nvPr>
+            <p:ph type="title"/>
+          </p:nvPr>
+        </p:nvSpPr>
+        <p:spPr/>
+        <p:txBody>
+          <a:bodyPr wrap="square" anchor="t"/>
+          <a:lstStyle/>
+          <a:p>
+            <a:pPr algn="l"/>
+            <a:r>
+              <a:t>Picture Header</a:t>
+            </a:r>
+          </a:p>
+        </p:txBody>
+      </p:sp>
+      <p:sp>
+        <p:nvSpPr>
+          <p:cNvPr id="3" name="Content Placeholder 2"/>
+          <p:cNvSpPr>
+            <a:spLocks noGrp="1"/>
+          </p:cNvSpPr>
+          <p:nvPr>
+            <p:ph idx="1"/>
+          </p:nvPr>
+        </p:nvSpPr>
+        <p:spPr/>
+        <p:txBody>
+          <a:bodyPr wrap="square" anchor="t"/>
+          <a:lstStyle/>
+          <a:p>
+            <a:pPr algn="l"/>
+            <a:r>
+              <a:t>Image Description</a:t>
+            </a:r>
+          </a:p>
+        </p:txBody>
+      </p:sp>
+      <p:sp>
+        <p:nvSpPr>
+          <p:cNvPr id="4" name="Text Placeholder 3"/>
+          <p:cNvSpPr>
+            <a:spLocks noGrp="1"/>
+          </p:cNvSpPr>
+          <p:nvPr>
+            <p:ph type="body" idx="2" sz="half"/>
+          </p:nvPr>
+        </p:nvSpPr>
+        <p:spPr/>
+        <p:txBody>
+          <a:bodyPr wrap="square" anchor="t"/>
+          <a:lstStyle/>
+          <a:p>
+            <a:pPr algn="l"/>
+            <a:r>
+              <a:t>Footer Text</a:t>
+            </a:r>
+          </a:p>
+        </p:txBody>
+      </p:sp>
+    </p:spTree>
+  </p:cSld>
+  <p:clrMapOvr>
+    <a:masterClrMapping/>
+  </p:clrMapOvr>
+</p:sld>
+</file>
+
+<file path=ppt/slides/slide4.xml><?xml version="1.0" encoding="utf-8"?>
+<p:sld xmlns:a="http://schemas.openxmlformats.org/drawingml/2006/main" xmlns:p="http://schemas.openxmlformats.org/presentationml/2006/main" xmlns:r="http://schemas.openxmlformats.org/officeDocument/2006/relationships">
+  <p:cSld>
+    <p:spTree>
+      <p:nvGrpSpPr>
+        <p:cNvPr id="1" name=""/>
+        <p:cNvGrpSpPr/>
+        <p:nvPr/>
+      </p:nvGrpSpPr>
+      <p:grpSpPr/>
+      <p:sp>
+        <p:nvSpPr>
+          <p:cNvPr id="2" name="Title 1"/>
+          <p:cNvSpPr>
+            <a:spLocks noGrp="1"/>
+          </p:cNvSpPr>
+          <p:nvPr>
+            <p:ph type="title"/>
+          </p:nvPr>
+        </p:nvSpPr>
+        <p:spPr/>
+        <p:txBody>
+          <a:bodyPr wrap="square" anchor="t"/>
+          <a:lstStyle/>
+          <a:p>
+            <a:pPr algn="l"/>
+            <a:r>
+              <a:t>Comparison Title</a:t>
+            </a:r>
+          </a:p>
+        </p:txBody>
+      </p:sp>
+      <p:sp>
+        <p:nvSpPr>
+          <p:cNvPr id="3" name="Text Placeholder 2"/>
+          <p:cNvSpPr>
+            <a:spLocks noGrp="1"/>
+          </p:cNvSpPr>
+          <p:nvPr>
+            <p:ph type="body" idx="1"/>
+          </p:nvPr>
+        </p:nvSpPr>
+        <p:spPr/>
+        <p:txBody>
+          <a:bodyPr wrap="square" anchor="t"/>
+          <a:lstStyle/>
+          <a:p>
+            <a:pPr algn="l"/>
+            <a:r>
+              <a:t>Item A</a:t>
+            </a:r>
+          </a:p>
+        </p:txBody>
+      </p:sp>
+      <p:sp>
+        <p:nvSpPr>
+          <p:cNvPr id="4" name="Content Placeholder 3"/>
+          <p:cNvSpPr>
+            <a:spLocks noGrp="1"/>
+          </p:cNvSpPr>
+          <p:nvPr>
+            <p:ph idx="2" sz="half"/>
+          </p:nvPr>
+        </p:nvSpPr>
+        <p:spPr/>
+        <p:txBody>
+          <a:bodyPr wrap="square" anchor="t"/>
+          <a:lstStyle/>
+          <a:p>
+            <a:pPr algn="l"/>
+            <a:r>
+              <a:t>Detail A</a:t>
+            </a:r>
+          </a:p>
+        </p:txBody>
+      </p:sp>
+      <p:sp>
+        <p:nvSpPr>
+          <p:cNvPr id="5" name="Text Placeholder 4"/>
+          <p:cNvSpPr>
+            <a:spLocks noGrp="1"/>
+          </p:cNvSpPr>
+          <p:nvPr>
+            <p:ph type="body" idx="3" sz="quarter"/>
+          </p:nvPr>
+        </p:nvSpPr>
+        <p:spPr/>
+        <p:txBody>
+          <a:bodyPr wrap="square" anchor="t"/>
+          <a:lstStyle/>
+          <a:p>
+            <a:pPr algn="l"/>
+            <a:r>
+              <a:t>Item B</a:t>
+            </a:r>
+          </a:p>
+        </p:txBody>
+      </p:sp>
+      <p:sp>
+        <p:nvSpPr>
+          <p:cNvPr id="6" name="Content Placeholder 5"/>
+          <p:cNvSpPr>
+            <a:spLocks noGrp="1"/>
+          </p:cNvSpPr>
+          <p:nvPr>
+            <p:ph idx="4" sz="quarter"/>
+          </p:nvPr>
+        </p:nvSpPr>
+        <p:spPr/>
+        <p:txBody>
+          <a:bodyPr wrap="square" anchor="t"/>
+          <a:lstStyle/>
+          <a:p>
+            <a:pPr algn="l"/>
+            <a:r>
+              <a:t>Detail B</a:t>
+            </a:r>
+          </a:p>
+        </p:txBody>
+      </p:sp>
+    </p:spTree>
+  </p:cSld>
+  <p:clrMapOvr>
+    <a:masterClrMapping/>
+  </p:clrMapOvr>
+</p:sld>
+</file>
+
+<file path=ppt/slides/slide5.xml><?xml version="1.0" encoding="utf-8"?>
+<p:sld xmlns:a="http://schemas.openxmlformats.org/drawingml/2006/main" xmlns:p="http://schemas.openxmlformats.org/presentationml/2006/main" xmlns:r="http://schemas.openxmlformats.org/officeDocument/2006/relationships">
+  <p:cSld>
+    <p:spTree>
+      <p:nvGrpSpPr>
+        <p:cNvPr id="1" name=""/>
+        <p:cNvGrpSpPr/>
+        <p:nvPr/>
+      </p:nvGrpSpPr>
+      <p:grpSpPr/>
+      <p:sp>
+        <p:nvSpPr>
+          <p:cNvPr id="2" name="Title 1"/>
+          <p:cNvSpPr>
+            <a:spLocks noGrp="1"/>
+          </p:cNvSpPr>
+          <p:nvPr>
+            <p:ph type="title"/>
+          </p:nvPr>
+        </p:nvSpPr>
+        <p:spPr/>
+        <p:txBody>
+          <a:bodyPr wrap="square" anchor="t"/>
+          <a:lstStyle/>
+          <a:p>
+            <a:pPr algn="l"/>
+            <a:r>
+              <a:t>Main Content</a:t>
+            </a:r>
+          </a:p>
+        </p:txBody>
+      </p:sp>
+      <p:sp>
+        <p:nvSpPr>
+          <p:cNvPr id="3" name="Content Placeholder 2"/>
+          <p:cNvSpPr>
+            <a:spLocks noGrp="1"/>
+          </p:cNvSpPr>
+          <p:nvPr>
+            <p:ph idx="1"/>
+          </p:nvPr>
+        </p:nvSpPr>
+        <p:spPr/>
+        <p:txBody>
+          <a:bodyPr wrap="square" anchor="t"/>
+          <a:lstStyle/>
+          <a:p>
+            <a:pPr algn="l"/>
+            <a:r>
+              <a:t>Caption Header</a:t>
+            </a:r>
+          </a:p>
+        </p:txBody>
+      </p:sp>
+      <p:sp>
+        <p:nvSpPr>
+          <p:cNvPr id="4" name="Text Placeholder 3"/>
+          <p:cNvSpPr>
+            <a:spLocks noGrp="1"/>
+          </p:cNvSpPr>
+          <p:nvPr>
+            <p:ph type="body" idx="2" sz="half"/>
+          </p:nvPr>
+        </p:nvSpPr>
+        <p:spPr/>
+        <p:txBody>
+          <a:bodyPr wrap="square" anchor="t"/>
+          <a:lstStyle/>
+          <a:p>
+            <a:pPr algn="l"/>
+            <a:r>
+              <a:t>Additional Info</a:t>
+            </a:r>
+          </a:p>
+        </p:txBody>
+      </p:sp>
+    </p:spTree>
+  </p:cSld>
+  <p:clrMapOvr>
+    <a:masterClrMapping/>
+  </p:clrMapOvr>
+</p:sld>
+</file>
+
 <file path=ppt/slides/slide6.xml><?xml version="1.0" encoding="utf-8"?>
 <p:sld xmlns:a="http://schemas.openxmlformats.org/drawingml/2006/main" xmlns:p="http://schemas.openxmlformats.org/presentationml/2006/main" xmlns:r="http://schemas.openxmlformats.org/officeDocument/2006/relationships">
   <p:cSld>
@@ -3910,63 +3886,96 @@
       <p:grpSpPr/>
       <p:sp>
         <p:nvSpPr>
-          <p:cNvPr id="2" name="Title 1"/>
-          <p:cNvSpPr>
-            <a:spLocks noGrp="1"/>
-          </p:cNvSpPr>
-          <p:nvPr>
-            <p:ph type="title"/>
-          </p:nvPr>
-        </p:nvSpPr>
-        <p:spPr/>
-        <p:txBody>
-          <a:bodyPr wrap="square"/>
-          <a:lstStyle/>
-          <a:p>
-            <a:r>
-              <a:t>Picture Header</a:t>
-            </a:r>
-          </a:p>
-        </p:txBody>
-      </p:sp>
-      <p:sp>
-        <p:nvSpPr>
-          <p:cNvPr id="3" name="Content Placeholder 2"/>
-          <p:cNvSpPr>
-            <a:spLocks noGrp="1"/>
-          </p:cNvSpPr>
-          <p:nvPr>
-            <p:ph idx="1"/>
-          </p:nvPr>
-        </p:nvSpPr>
-        <p:spPr/>
-        <p:txBody>
-          <a:bodyPr wrap="square"/>
-          <a:lstStyle/>
-          <a:p>
-            <a:r>
-              <a:t>Image Description</a:t>
-            </a:r>
-          </a:p>
-        </p:txBody>
-      </p:sp>
-      <p:sp>
-        <p:nvSpPr>
-          <p:cNvPr id="4" name="Text Placeholder 3"/>
-          <p:cNvSpPr>
-            <a:spLocks noGrp="1"/>
-          </p:cNvSpPr>
-          <p:nvPr>
-            <p:ph type="body" idx="2" sz="half"/>
-          </p:nvPr>
-        </p:nvSpPr>
-        <p:spPr/>
-        <p:txBody>
-          <a:bodyPr wrap="square"/>
-          <a:lstStyle/>
-          <a:p>
-            <a:r>
-              <a:t>Footer Text</a:t>
+          <p:cNvPr id="2" name="TextBox 1"/>
+          <p:cNvSpPr txBox="1"/>
+          <p:nvPr/>
+        </p:nvSpPr>
+        <p:spPr>
+          <a:xfrm>
+            <a:off x="841248" y="2139696"/>
+            <a:ext cx="10515600" cy="1325880"/>
+          </a:xfrm>
+          <a:prstGeom prst="rect">
+            <a:avLst/>
+          </a:prstGeom>
+          <a:noFill/>
+        </p:spPr>
+        <p:txBody>
+          <a:bodyPr wrap="square" anchor="b">
+            <a:spAutoFit/>
+          </a:bodyPr>
+          <a:lstStyle/>
+          <a:p>
+            <a:pPr algn="r"/>
+            <a:r>
+              <a:rPr sz="3600" b="1">
+                <a:latin typeface="Avenir LT Next Pro"/>
+              </a:rPr>
+              <a:t>Presentation Title</a:t>
+            </a:r>
+          </a:p>
+        </p:txBody>
+      </p:sp>
+      <p:sp>
+        <p:nvSpPr>
+          <p:cNvPr id="3" name="TextBox 2"/>
+          <p:cNvSpPr txBox="1"/>
+          <p:nvPr/>
+        </p:nvSpPr>
+        <p:spPr>
+          <a:xfrm>
+            <a:off x="841248" y="3474720"/>
+            <a:ext cx="10515600" cy="914400"/>
+          </a:xfrm>
+          <a:prstGeom prst="rect">
+            <a:avLst/>
+          </a:prstGeom>
+          <a:noFill/>
+        </p:spPr>
+        <p:txBody>
+          <a:bodyPr wrap="square" anchor="t">
+            <a:spAutoFit/>
+          </a:bodyPr>
+          <a:lstStyle/>
+          <a:p>
+            <a:pPr algn="r"/>
+            <a:r>
+              <a:rPr sz="3600" b="1" i="1">
+                <a:solidFill>
+                  <a:srgbClr val="4EA72E"/>
+                </a:solidFill>
+              </a:rPr>
+              <a:t>Strategic Report</a:t>
+            </a:r>
+          </a:p>
+        </p:txBody>
+      </p:sp>
+      <p:sp>
+        <p:nvSpPr>
+          <p:cNvPr id="4" name="TextBox 3"/>
+          <p:cNvSpPr txBox="1"/>
+          <p:nvPr/>
+        </p:nvSpPr>
+        <p:spPr>
+          <a:xfrm>
+            <a:off x="841248" y="4919472"/>
+            <a:ext cx="10515600" cy="914400"/>
+          </a:xfrm>
+          <a:prstGeom prst="rect">
+            <a:avLst/>
+          </a:prstGeom>
+          <a:noFill/>
+        </p:spPr>
+        <p:txBody>
+          <a:bodyPr wrap="square" anchor="t">
+            <a:spAutoFit/>
+          </a:bodyPr>
+          <a:lstStyle/>
+          <a:p>
+            <a:pPr algn="r"/>
+            <a:r>
+              <a:rPr sz="2400" b="1"/>
+              <a:t>April 2025</a:t>
             </a:r>
           </a:p>
         </p:txBody>
@@ -4001,9 +4010,10 @@
         </p:nvSpPr>
         <p:spPr/>
         <p:txBody>
-          <a:bodyPr wrap="square"/>
-          <a:lstStyle/>
-          <a:p>
+          <a:bodyPr wrap="square" anchor="t"/>
+          <a:lstStyle/>
+          <a:p>
+            <a:pPr algn="l"/>
             <a:r>
               <a:t>Section 1</a:t>
             </a:r>
@@ -4022,9 +4032,10 @@
         </p:nvSpPr>
         <p:spPr/>
         <p:txBody>
-          <a:bodyPr wrap="square"/>
-          <a:lstStyle/>
-          <a:p>
+          <a:bodyPr wrap="square" anchor="t"/>
+          <a:lstStyle/>
+          <a:p>
+            <a:pPr algn="l"/>
             <a:r>
               <a:t>Overview of Insights</a:t>
             </a:r>
@@ -4324,9 +4335,10 @@
         </p:nvSpPr>
         <p:spPr/>
         <p:txBody>
-          <a:bodyPr wrap="square"/>
-          <a:lstStyle/>
-          <a:p>
+          <a:bodyPr wrap="square" anchor="t"/>
+          <a:lstStyle/>
+          <a:p>
+            <a:pPr algn="l"/>
             <a:r>
               <a:t>Final Thoughts</a:t>
             </a:r>
@@ -4345,22 +4357,22 @@
         </p:nvSpPr>
         <p:spPr/>
         <p:txBody>
-          <a:bodyPr wrap="square"/>
-          <a:lstStyle/>
-          <a:p>
-            <a:pPr/>
+          <a:bodyPr wrap="square" anchor="t"/>
+          <a:lstStyle/>
+          <a:p>
+            <a:pPr algn="l"/>
             <a:r>
               <a:t>Summary 1</a:t>
             </a:r>
           </a:p>
           <a:p>
-            <a:pPr/>
+            <a:pPr algn="l"/>
             <a:r>
               <a:t>Summary 2</a:t>
             </a:r>
           </a:p>
           <a:p>
-            <a:pPr/>
+            <a:pPr algn="l"/>
             <a:r>
               <a:t>Action Plan</a:t>
             </a:r>

</xml_diff>